<commit_message>
Update Fig 1; add organisation types
</commit_message>
<xml_diff>
--- a/reports/figures/edit-desindex-panel-figures.pptx
+++ b/reports/figures/edit-desindex-panel-figures.pptx
@@ -3620,7 +3620,7 @@
           <a:p>
             <a:fld id="{CEB57C05-9606-4C2E-9455-9A368AB37763}" type="datetimeFigureOut">
               <a:rPr lang="en-GB" smtClean="0"/>
-              <a:t>09/03/2024</a:t>
+              <a:t>11/03/2024</a:t>
             </a:fld>
             <a:endParaRPr lang="en-GB"/>
           </a:p>
@@ -4197,7 +4197,7 @@
           <a:p>
             <a:fld id="{846CE7D5-CF57-46EF-B807-FDD0502418D4}" type="datetimeFigureOut">
               <a:rPr lang="en-GB" smtClean="0"/>
-              <a:t>09/03/2024</a:t>
+              <a:t>11/03/2024</a:t>
             </a:fld>
             <a:endParaRPr lang="en-GB"/>
           </a:p>
@@ -4367,7 +4367,7 @@
           <a:p>
             <a:fld id="{846CE7D5-CF57-46EF-B807-FDD0502418D4}" type="datetimeFigureOut">
               <a:rPr lang="en-GB" smtClean="0"/>
-              <a:t>09/03/2024</a:t>
+              <a:t>11/03/2024</a:t>
             </a:fld>
             <a:endParaRPr lang="en-GB"/>
           </a:p>
@@ -4547,7 +4547,7 @@
           <a:p>
             <a:fld id="{846CE7D5-CF57-46EF-B807-FDD0502418D4}" type="datetimeFigureOut">
               <a:rPr lang="en-GB" smtClean="0"/>
-              <a:t>09/03/2024</a:t>
+              <a:t>11/03/2024</a:t>
             </a:fld>
             <a:endParaRPr lang="en-GB"/>
           </a:p>
@@ -4717,7 +4717,7 @@
           <a:p>
             <a:fld id="{846CE7D5-CF57-46EF-B807-FDD0502418D4}" type="datetimeFigureOut">
               <a:rPr lang="en-GB" smtClean="0"/>
-              <a:t>09/03/2024</a:t>
+              <a:t>11/03/2024</a:t>
             </a:fld>
             <a:endParaRPr lang="en-GB"/>
           </a:p>
@@ -4961,7 +4961,7 @@
           <a:p>
             <a:fld id="{846CE7D5-CF57-46EF-B807-FDD0502418D4}" type="datetimeFigureOut">
               <a:rPr lang="en-GB" smtClean="0"/>
-              <a:t>09/03/2024</a:t>
+              <a:t>11/03/2024</a:t>
             </a:fld>
             <a:endParaRPr lang="en-GB"/>
           </a:p>
@@ -5193,7 +5193,7 @@
           <a:p>
             <a:fld id="{846CE7D5-CF57-46EF-B807-FDD0502418D4}" type="datetimeFigureOut">
               <a:rPr lang="en-GB" smtClean="0"/>
-              <a:t>09/03/2024</a:t>
+              <a:t>11/03/2024</a:t>
             </a:fld>
             <a:endParaRPr lang="en-GB"/>
           </a:p>
@@ -5560,7 +5560,7 @@
           <a:p>
             <a:fld id="{846CE7D5-CF57-46EF-B807-FDD0502418D4}" type="datetimeFigureOut">
               <a:rPr lang="en-GB" smtClean="0"/>
-              <a:t>09/03/2024</a:t>
+              <a:t>11/03/2024</a:t>
             </a:fld>
             <a:endParaRPr lang="en-GB"/>
           </a:p>
@@ -5678,7 +5678,7 @@
           <a:p>
             <a:fld id="{846CE7D5-CF57-46EF-B807-FDD0502418D4}" type="datetimeFigureOut">
               <a:rPr lang="en-GB" smtClean="0"/>
-              <a:t>09/03/2024</a:t>
+              <a:t>11/03/2024</a:t>
             </a:fld>
             <a:endParaRPr lang="en-GB"/>
           </a:p>
@@ -5773,7 +5773,7 @@
           <a:p>
             <a:fld id="{846CE7D5-CF57-46EF-B807-FDD0502418D4}" type="datetimeFigureOut">
               <a:rPr lang="en-GB" smtClean="0"/>
-              <a:t>09/03/2024</a:t>
+              <a:t>11/03/2024</a:t>
             </a:fld>
             <a:endParaRPr lang="en-GB"/>
           </a:p>
@@ -6050,7 +6050,7 @@
           <a:p>
             <a:fld id="{846CE7D5-CF57-46EF-B807-FDD0502418D4}" type="datetimeFigureOut">
               <a:rPr lang="en-GB" smtClean="0"/>
-              <a:t>09/03/2024</a:t>
+              <a:t>11/03/2024</a:t>
             </a:fld>
             <a:endParaRPr lang="en-GB"/>
           </a:p>
@@ -6307,7 +6307,7 @@
           <a:p>
             <a:fld id="{846CE7D5-CF57-46EF-B807-FDD0502418D4}" type="datetimeFigureOut">
               <a:rPr lang="en-GB" smtClean="0"/>
-              <a:t>09/03/2024</a:t>
+              <a:t>11/03/2024</a:t>
             </a:fld>
             <a:endParaRPr lang="en-GB"/>
           </a:p>
@@ -6520,7 +6520,7 @@
           <a:p>
             <a:fld id="{846CE7D5-CF57-46EF-B807-FDD0502418D4}" type="datetimeFigureOut">
               <a:rPr lang="en-GB" smtClean="0"/>
-              <a:t>09/03/2024</a:t>
+              <a:t>11/03/2024</a:t>
             </a:fld>
             <a:endParaRPr lang="en-GB"/>
           </a:p>
@@ -9033,7 +9033,7 @@
         </p:nvSpPr>
         <p:spPr>
           <a:xfrm>
-            <a:off x="4099268" y="4274547"/>
+            <a:off x="4095458" y="4274547"/>
             <a:ext cx="530472" cy="175882"/>
           </a:xfrm>
           <a:prstGeom prst="rect">
@@ -9379,11 +9379,14 @@
           <a:p>
             <a:pPr algn="ctr"/>
             <a:r>
-              <a:rPr lang="en-GB" sz="543" b="1" dirty="0">
+              <a:rPr lang="en-GB" sz="543" b="1" dirty="0" smtClean="0">
                 <a:latin typeface="Helvetica" pitchFamily="2" charset="0"/>
               </a:rPr>
-              <a:t>468 Organisations </a:t>
-            </a:r>
+              <a:t>57 central government organisations </a:t>
+            </a:r>
+            <a:endParaRPr lang="en-GB" sz="543" b="1" dirty="0">
+              <a:latin typeface="Helvetica" pitchFamily="2" charset="0"/>
+            </a:endParaRPr>
           </a:p>
           <a:p>
             <a:pPr algn="ctr"/>
@@ -9391,7 +9394,31 @@
               <a:rPr lang="en-GB" sz="543" dirty="0">
                 <a:latin typeface="Helvetica" pitchFamily="2" charset="0"/>
               </a:rPr>
-              <a:t>(i.e., 44 departments, 424 executive agencies and public bodies)</a:t>
+              <a:t>(i.e</a:t>
+            </a:r>
+            <a:r>
+              <a:rPr lang="en-GB" sz="543" dirty="0" smtClean="0">
+                <a:latin typeface="Helvetica" pitchFamily="2" charset="0"/>
+              </a:rPr>
+              <a:t>., 22 departments</a:t>
+            </a:r>
+            <a:r>
+              <a:rPr lang="en-GB" sz="543" dirty="0">
+                <a:latin typeface="Helvetica" pitchFamily="2" charset="0"/>
+              </a:rPr>
+              <a:t>, </a:t>
+            </a:r>
+            <a:r>
+              <a:rPr lang="en-GB" sz="543" dirty="0" smtClean="0">
+                <a:latin typeface="Helvetica" pitchFamily="2" charset="0"/>
+              </a:rPr>
+              <a:t>35 </a:t>
+            </a:r>
+            <a:r>
+              <a:rPr lang="en-GB" sz="543" dirty="0">
+                <a:latin typeface="Helvetica" pitchFamily="2" charset="0"/>
+              </a:rPr>
+              <a:t>executive agencies and public bodies)</a:t>
             </a:r>
           </a:p>
         </p:txBody>
@@ -21209,15 +21236,15 @@
 <file path=customXml/itemProps2.xml><?xml version="1.0" encoding="utf-8"?>
 <ds:datastoreItem xmlns:ds="http://schemas.openxmlformats.org/officeDocument/2006/customXml" ds:itemID="{CB15E116-BD27-4B83-9379-B22A911FE43D}">
   <ds:schemaRefs>
-    <ds:schemaRef ds:uri="http://schemas.microsoft.com/office/2006/documentManagement/types"/>
     <ds:schemaRef ds:uri="http://purl.org/dc/terms/"/>
-    <ds:schemaRef ds:uri="http://www.w3.org/XML/1998/namespace"/>
     <ds:schemaRef ds:uri="5cad2852-fd11-4253-a5dd-38f1c2375401"/>
-    <ds:schemaRef ds:uri="http://schemas.microsoft.com/office/infopath/2007/PartnerControls"/>
     <ds:schemaRef ds:uri="http://purl.org/dc/elements/1.1/"/>
     <ds:schemaRef ds:uri="http://schemas.openxmlformats.org/package/2006/metadata/core-properties"/>
+    <ds:schemaRef ds:uri="http://schemas.microsoft.com/office/2006/metadata/properties"/>
+    <ds:schemaRef ds:uri="http://schemas.microsoft.com/office/2006/documentManagement/types"/>
+    <ds:schemaRef ds:uri="http://schemas.microsoft.com/office/infopath/2007/PartnerControls"/>
     <ds:schemaRef ds:uri="d67fce5f-2f04-4f7c-8e45-1ec614d56b91"/>
-    <ds:schemaRef ds:uri="http://schemas.microsoft.com/office/2006/metadata/properties"/>
+    <ds:schemaRef ds:uri="http://www.w3.org/XML/1998/namespace"/>
     <ds:schemaRef ds:uri="http://purl.org/dc/dcmitype/"/>
   </ds:schemaRefs>
 </ds:datastoreItem>

</xml_diff>